<commit_message>
made tweaks to some files of Arduino
</commit_message>
<xml_diff>
--- a/299presentation.pptx
+++ b/299presentation.pptx
@@ -431,7 +431,7 @@
           <a:p>
             <a:fld id="{5E057304-B358-42C3-918E-1A1A6A4BEC62}" type="datetimeFigureOut">
               <a:rPr lang="en-US" smtClean="0"/>
-              <a:t>12/22/2019</a:t>
+              <a:t>12/24/2019</a:t>
             </a:fld>
             <a:endParaRPr lang="en-US"/>
           </a:p>
@@ -639,7 +639,7 @@
           <a:p>
             <a:fld id="{5E057304-B358-42C3-918E-1A1A6A4BEC62}" type="datetimeFigureOut">
               <a:rPr lang="en-US" smtClean="0"/>
-              <a:t>12/22/2019</a:t>
+              <a:t>12/24/2019</a:t>
             </a:fld>
             <a:endParaRPr lang="en-US"/>
           </a:p>
@@ -895,7 +895,7 @@
           <a:p>
             <a:fld id="{5E057304-B358-42C3-918E-1A1A6A4BEC62}" type="datetimeFigureOut">
               <a:rPr lang="en-US" smtClean="0"/>
-              <a:t>12/22/2019</a:t>
+              <a:t>12/24/2019</a:t>
             </a:fld>
             <a:endParaRPr lang="en-US"/>
           </a:p>
@@ -1069,7 +1069,7 @@
           <a:p>
             <a:fld id="{5E057304-B358-42C3-918E-1A1A6A4BEC62}" type="datetimeFigureOut">
               <a:rPr lang="en-US" smtClean="0"/>
-              <a:t>12/22/2019</a:t>
+              <a:t>12/24/2019</a:t>
             </a:fld>
             <a:endParaRPr lang="en-US"/>
           </a:p>
@@ -1412,7 +1412,7 @@
           <a:p>
             <a:fld id="{5E057304-B358-42C3-918E-1A1A6A4BEC62}" type="datetimeFigureOut">
               <a:rPr lang="en-US" smtClean="0"/>
-              <a:t>12/22/2019</a:t>
+              <a:t>12/24/2019</a:t>
             </a:fld>
             <a:endParaRPr lang="en-US"/>
           </a:p>
@@ -1687,7 +1687,7 @@
           <a:p>
             <a:fld id="{5E057304-B358-42C3-918E-1A1A6A4BEC62}" type="datetimeFigureOut">
               <a:rPr lang="en-US" smtClean="0"/>
-              <a:t>12/22/2019</a:t>
+              <a:t>12/24/2019</a:t>
             </a:fld>
             <a:endParaRPr lang="en-US"/>
           </a:p>
@@ -2066,7 +2066,7 @@
           <a:p>
             <a:fld id="{5E057304-B358-42C3-918E-1A1A6A4BEC62}" type="datetimeFigureOut">
               <a:rPr lang="en-US" smtClean="0"/>
-              <a:t>12/22/2019</a:t>
+              <a:t>12/24/2019</a:t>
             </a:fld>
             <a:endParaRPr lang="en-US"/>
           </a:p>
@@ -2184,7 +2184,7 @@
           <a:p>
             <a:fld id="{5E057304-B358-42C3-918E-1A1A6A4BEC62}" type="datetimeFigureOut">
               <a:rPr lang="en-US" smtClean="0"/>
-              <a:t>12/22/2019</a:t>
+              <a:t>12/24/2019</a:t>
             </a:fld>
             <a:endParaRPr lang="en-US"/>
           </a:p>
@@ -2355,7 +2355,7 @@
           <a:p>
             <a:fld id="{5E057304-B358-42C3-918E-1A1A6A4BEC62}" type="datetimeFigureOut">
               <a:rPr lang="en-US" smtClean="0"/>
-              <a:t>12/22/2019</a:t>
+              <a:t>12/24/2019</a:t>
             </a:fld>
             <a:endParaRPr lang="en-US"/>
           </a:p>
@@ -2709,7 +2709,7 @@
           <a:p>
             <a:fld id="{5E057304-B358-42C3-918E-1A1A6A4BEC62}" type="datetimeFigureOut">
               <a:rPr lang="en-US" smtClean="0"/>
-              <a:t>12/22/2019</a:t>
+              <a:t>12/24/2019</a:t>
             </a:fld>
             <a:endParaRPr lang="en-US"/>
           </a:p>
@@ -3091,7 +3091,7 @@
           <a:p>
             <a:fld id="{5E057304-B358-42C3-918E-1A1A6A4BEC62}" type="datetimeFigureOut">
               <a:rPr lang="en-US" smtClean="0"/>
-              <a:t>12/22/2019</a:t>
+              <a:t>12/24/2019</a:t>
             </a:fld>
             <a:endParaRPr lang="en-US"/>
           </a:p>
@@ -3378,7 +3378,7 @@
           <a:p>
             <a:fld id="{5E057304-B358-42C3-918E-1A1A6A4BEC62}" type="datetimeFigureOut">
               <a:rPr lang="en-US" smtClean="0"/>
-              <a:t>12/22/2019</a:t>
+              <a:t>12/24/2019</a:t>
             </a:fld>
             <a:endParaRPr lang="en-US"/>
           </a:p>
@@ -4935,7 +4935,7 @@
             <p:ph idx="1"/>
             <p:extLst>
               <p:ext uri="{D42A27DB-BD31-4B8C-83A1-F6EECF244321}">
-                <p14:modId xmlns:p14="http://schemas.microsoft.com/office/powerpoint/2010/main" val="3010561335"/>
+                <p14:modId xmlns:p14="http://schemas.microsoft.com/office/powerpoint/2010/main" val="3892318255"/>
               </p:ext>
             </p:extLst>
           </p:nvPr>
@@ -5013,12 +5013,8 @@
                     <a:lstStyle/>
                     <a:p>
                       <a:r>
-                        <a:rPr lang="en-US" dirty="0" err="1"/>
-                        <a:t>Tahrim</a:t>
-                      </a:r>
-                      <a:r>
                         <a:rPr lang="en-US" dirty="0"/>
-                        <a:t>, Samiha, </a:t>
+                        <a:t>Tushar, Samiha, </a:t>
                       </a:r>
                       <a:r>
                         <a:rPr lang="en-US" dirty="0" err="1"/>
@@ -5133,10 +5129,9 @@
                     <a:lstStyle/>
                     <a:p>
                       <a:r>
-                        <a:rPr lang="en-US" dirty="0" err="1"/>
-                        <a:t>Tahrim</a:t>
+                        <a:rPr lang="en-US" dirty="0"/>
+                        <a:t>Tushar</a:t>
                       </a:r>
-                      <a:endParaRPr lang="en-US" dirty="0"/>
                     </a:p>
                   </a:txBody>
                   <a:tcPr/>
@@ -5225,7 +5220,7 @@
                     <a:p>
                       <a:r>
                         <a:rPr lang="en-US" dirty="0"/>
-                        <a:t>Backend and database </a:t>
+                        <a:t>Backend and Database and Data Analysis</a:t>
                       </a:r>
                     </a:p>
                   </a:txBody>
@@ -5237,12 +5232,8 @@
                     <a:lstStyle/>
                     <a:p>
                       <a:r>
-                        <a:rPr lang="en-US" dirty="0" err="1"/>
-                        <a:t>Tahrim</a:t>
-                      </a:r>
-                      <a:r>
                         <a:rPr lang="en-US" dirty="0"/>
-                        <a:t> </a:t>
+                        <a:t>Tushar </a:t>
                       </a:r>
                     </a:p>
                   </a:txBody>
@@ -5577,7 +5568,15 @@
           <a:p>
             <a:r>
               <a:rPr lang="en-US" sz="2800" dirty="0"/>
-              <a:t>This is the first generation of Arduino based mini-weather station with Wi-Fi connection, which is able to post data publicly on the website that created.</a:t>
+              <a:t>This is the first generation of Arduino based mini-weather station with Wi-Fi connection, which is able to post data publicly on the website that </a:t>
+            </a:r>
+            <a:r>
+              <a:rPr lang="en-US" sz="2800"/>
+              <a:t>we have created</a:t>
+            </a:r>
+            <a:r>
+              <a:rPr lang="en-US" sz="2800" dirty="0"/>
+              <a:t>.</a:t>
             </a:r>
           </a:p>
           <a:p>
@@ -6339,13 +6338,13 @@
   <p:clrMapOvr>
     <a:masterClrMapping/>
   </p:clrMapOvr>
-  <mc:AlternateContent xmlns:mc="http://schemas.openxmlformats.org/markup-compatibility/2006">
-    <mc:Choice xmlns:p14="http://schemas.microsoft.com/office/powerpoint/2010/main" Requires="p14">
+  <mc:AlternateContent xmlns:mc="http://schemas.openxmlformats.org/markup-compatibility/2006" xmlns:p14="http://schemas.microsoft.com/office/powerpoint/2010/main">
+    <mc:Choice Requires="p14">
       <p:transition spd="slow" p14:dur="1500">
         <p:split orient="vert"/>
       </p:transition>
     </mc:Choice>
-    <mc:Fallback>
+    <mc:Fallback xmlns="">
       <p:transition spd="slow">
         <p:split orient="vert"/>
       </p:transition>
@@ -6444,13 +6443,13 @@
   <p:clrMapOvr>
     <a:masterClrMapping/>
   </p:clrMapOvr>
-  <mc:AlternateContent xmlns:mc="http://schemas.openxmlformats.org/markup-compatibility/2006">
-    <mc:Choice xmlns:p14="http://schemas.microsoft.com/office/powerpoint/2010/main" Requires="p14">
+  <mc:AlternateContent xmlns:mc="http://schemas.openxmlformats.org/markup-compatibility/2006" xmlns:p14="http://schemas.microsoft.com/office/powerpoint/2010/main">
+    <mc:Choice Requires="p14">
       <p:transition spd="slow" p14:dur="1500">
         <p:split orient="vert"/>
       </p:transition>
     </mc:Choice>
-    <mc:Fallback>
+    <mc:Fallback xmlns="">
       <p:transition spd="slow">
         <p:split orient="vert"/>
       </p:transition>
@@ -6549,13 +6548,13 @@
   <p:clrMapOvr>
     <a:masterClrMapping/>
   </p:clrMapOvr>
-  <mc:AlternateContent xmlns:mc="http://schemas.openxmlformats.org/markup-compatibility/2006">
-    <mc:Choice xmlns:p14="http://schemas.microsoft.com/office/powerpoint/2010/main" Requires="p14">
+  <mc:AlternateContent xmlns:mc="http://schemas.openxmlformats.org/markup-compatibility/2006" xmlns:p14="http://schemas.microsoft.com/office/powerpoint/2010/main">
+    <mc:Choice Requires="p14">
       <p:transition spd="slow" p14:dur="1500">
         <p:split orient="vert"/>
       </p:transition>
     </mc:Choice>
-    <mc:Fallback>
+    <mc:Fallback xmlns="">
       <p:transition spd="slow">
         <p:split orient="vert"/>
       </p:transition>

</xml_diff>

<commit_message>
modified the presentation slides
</commit_message>
<xml_diff>
--- a/299presentation.pptx
+++ b/299presentation.pptx
@@ -12,27 +12,28 @@
     <p:sldId id="259" r:id="rId6"/>
     <p:sldId id="260" r:id="rId7"/>
     <p:sldId id="262" r:id="rId8"/>
-    <p:sldId id="271" r:id="rId9"/>
-    <p:sldId id="263" r:id="rId10"/>
-    <p:sldId id="264" r:id="rId11"/>
-    <p:sldId id="265" r:id="rId12"/>
-    <p:sldId id="261" r:id="rId13"/>
-    <p:sldId id="266" r:id="rId14"/>
-    <p:sldId id="268" r:id="rId15"/>
-    <p:sldId id="269" r:id="rId16"/>
-    <p:sldId id="270" r:id="rId17"/>
-    <p:sldId id="273" r:id="rId18"/>
-    <p:sldId id="275" r:id="rId19"/>
-    <p:sldId id="279" r:id="rId20"/>
-    <p:sldId id="276" r:id="rId21"/>
-    <p:sldId id="280" r:id="rId22"/>
-    <p:sldId id="277" r:id="rId23"/>
-    <p:sldId id="281" r:id="rId24"/>
-    <p:sldId id="282" r:id="rId25"/>
-    <p:sldId id="283" r:id="rId26"/>
-    <p:sldId id="274" r:id="rId27"/>
-    <p:sldId id="278" r:id="rId28"/>
-    <p:sldId id="272" r:id="rId29"/>
+    <p:sldId id="284" r:id="rId9"/>
+    <p:sldId id="271" r:id="rId10"/>
+    <p:sldId id="263" r:id="rId11"/>
+    <p:sldId id="264" r:id="rId12"/>
+    <p:sldId id="265" r:id="rId13"/>
+    <p:sldId id="261" r:id="rId14"/>
+    <p:sldId id="266" r:id="rId15"/>
+    <p:sldId id="268" r:id="rId16"/>
+    <p:sldId id="269" r:id="rId17"/>
+    <p:sldId id="270" r:id="rId18"/>
+    <p:sldId id="273" r:id="rId19"/>
+    <p:sldId id="275" r:id="rId20"/>
+    <p:sldId id="279" r:id="rId21"/>
+    <p:sldId id="276" r:id="rId22"/>
+    <p:sldId id="280" r:id="rId23"/>
+    <p:sldId id="277" r:id="rId24"/>
+    <p:sldId id="281" r:id="rId25"/>
+    <p:sldId id="282" r:id="rId26"/>
+    <p:sldId id="283" r:id="rId27"/>
+    <p:sldId id="274" r:id="rId28"/>
+    <p:sldId id="278" r:id="rId29"/>
+    <p:sldId id="272" r:id="rId30"/>
   </p:sldIdLst>
   <p:sldSz cx="12192000" cy="6858000"/>
   <p:notesSz cx="6858000" cy="9144000"/>
@@ -143,6 +144,7 @@
             <p14:sldId id="259"/>
             <p14:sldId id="260"/>
             <p14:sldId id="262"/>
+            <p14:sldId id="284"/>
             <p14:sldId id="271"/>
             <p14:sldId id="263"/>
             <p14:sldId id="264"/>
@@ -4087,7 +4089,7 @@
           <p:cNvPr id="2" name="Title 1">
             <a:extLst>
               <a:ext uri="{FF2B5EF4-FFF2-40B4-BE49-F238E27FC236}">
-                <a16:creationId xmlns:a16="http://schemas.microsoft.com/office/drawing/2014/main" id="{3A9B947D-EC87-45C7-898E-B45223553C30}"/>
+                <a16:creationId xmlns:a16="http://schemas.microsoft.com/office/drawing/2014/main" id="{77022CDD-5C30-4DD9-978D-449A42B3BD97}"/>
               </a:ext>
             </a:extLst>
           </p:cNvPr>
@@ -4105,48 +4107,128 @@
           <a:p>
             <a:r>
               <a:rPr lang="en-US" dirty="0"/>
-              <a:t>Our aim:</a:t>
-            </a:r>
-          </a:p>
-        </p:txBody>
-      </p:sp>
-      <p:sp>
-        <p:nvSpPr>
-          <p:cNvPr id="3" name="Content Placeholder 2">
+              <a:t>Pressure sensor (bmp 180)</a:t>
+            </a:r>
+          </a:p>
+        </p:txBody>
+      </p:sp>
+      <p:pic>
+        <p:nvPicPr>
+          <p:cNvPr id="6" name="Content Placeholder 5">
             <a:extLst>
               <a:ext uri="{FF2B5EF4-FFF2-40B4-BE49-F238E27FC236}">
-                <a16:creationId xmlns:a16="http://schemas.microsoft.com/office/drawing/2014/main" id="{EB73CC94-16EC-415A-B7A1-942E3317D5AA}"/>
+                <a16:creationId xmlns:a16="http://schemas.microsoft.com/office/drawing/2014/main" id="{E46EB732-01F7-41ED-AA3F-BEBB6B1E9AED}"/>
               </a:ext>
             </a:extLst>
           </p:cNvPr>
-          <p:cNvSpPr>
-            <a:spLocks noGrp="1"/>
-          </p:cNvSpPr>
+          <p:cNvPicPr>
+            <a:picLocks noGrp="1" noChangeAspect="1"/>
+          </p:cNvPicPr>
           <p:nvPr>
             <p:ph idx="1"/>
           </p:nvPr>
-        </p:nvSpPr>
-        <p:spPr/>
-        <p:txBody>
-          <a:bodyPr>
-            <a:normAutofit/>
+        </p:nvPicPr>
+        <p:blipFill>
+          <a:blip r:embed="rId2">
+            <a:extLst>
+              <a:ext uri="{28A0092B-C50C-407E-A947-70E740481C1C}">
+                <a14:useLocalDpi xmlns:a14="http://schemas.microsoft.com/office/drawing/2010/main" val="0"/>
+              </a:ext>
+            </a:extLst>
+          </a:blip>
+          <a:stretch>
+            <a:fillRect/>
+          </a:stretch>
+        </p:blipFill>
+        <p:spPr>
+          <a:xfrm>
+            <a:off x="8143092" y="1987826"/>
+            <a:ext cx="3811059" cy="3811059"/>
+          </a:xfrm>
+        </p:spPr>
+      </p:pic>
+      <p:sp>
+        <p:nvSpPr>
+          <p:cNvPr id="4" name="Rectangle 3">
+            <a:extLst>
+              <a:ext uri="{FF2B5EF4-FFF2-40B4-BE49-F238E27FC236}">
+                <a16:creationId xmlns:a16="http://schemas.microsoft.com/office/drawing/2014/main" id="{B314C108-267D-448E-9E9A-C8DA7596824E}"/>
+              </a:ext>
+            </a:extLst>
+          </p:cNvPr>
+          <p:cNvSpPr/>
+          <p:nvPr/>
+        </p:nvSpPr>
+        <p:spPr>
+          <a:xfrm>
+            <a:off x="1097280" y="1845734"/>
+            <a:ext cx="6588981" cy="3108543"/>
+          </a:xfrm>
+          <a:prstGeom prst="rect">
+            <a:avLst/>
+          </a:prstGeom>
+        </p:spPr>
+        <p:txBody>
+          <a:bodyPr wrap="square">
+            <a:spAutoFit/>
           </a:bodyPr>
           <a:lstStyle/>
           <a:p>
-            <a:pPr marL="201168" lvl="1" indent="0">
-              <a:buNone/>
-            </a:pPr>
-            <a:r>
-              <a:rPr lang="en-US" sz="2800" dirty="0"/>
-              <a:t>Weather is the part and parcel in our day to day life. We all need the day to day update of the weather. This can be very beneficial for many who depend on weather information as part of their everyday lives like farmers, outdoorsy types and many weather enthusiasts . Our aim was simple , to make a mini weather station using the sensors at an affordable price . </a:t>
-            </a:r>
+            <a:r>
+              <a:rPr lang="en-US" sz="2800" dirty="0">
+                <a:solidFill>
+                  <a:srgbClr val="333333"/>
+                </a:solidFill>
+                <a:latin typeface="Helvetica Neue"/>
+              </a:rPr>
+              <a:t>The definition of pressure is a force "pressing" on an area. A common unit of pressure is pounds per square inch (psi). One pound, pressing on one square inch, equals one psi. The </a:t>
+            </a:r>
+            <a:r>
+              <a:rPr lang="en-US" sz="2800" dirty="0">
+                <a:solidFill>
+                  <a:srgbClr val="E0311D"/>
+                </a:solidFill>
+                <a:latin typeface="Helvetica Neue"/>
+                <a:hlinkClick r:id="rId3"/>
+              </a:rPr>
+              <a:t>SI unit</a:t>
+            </a:r>
+            <a:r>
+              <a:rPr lang="en-US" sz="2800" dirty="0">
+                <a:solidFill>
+                  <a:srgbClr val="333333"/>
+                </a:solidFill>
+                <a:latin typeface="Helvetica Neue"/>
+              </a:rPr>
+              <a:t> is newtons per square meter, which are called </a:t>
+            </a:r>
+            <a:r>
+              <a:rPr lang="en-US" sz="2800" dirty="0">
+                <a:solidFill>
+                  <a:srgbClr val="E0311D"/>
+                </a:solidFill>
+                <a:latin typeface="Helvetica Neue"/>
+                <a:hlinkClick r:id="rId4"/>
+              </a:rPr>
+              <a:t>pascals (Pa)</a:t>
+            </a:r>
+            <a:r>
+              <a:rPr lang="en-US" sz="2800" dirty="0">
+                <a:solidFill>
+                  <a:srgbClr val="333333"/>
+                </a:solidFill>
+                <a:latin typeface="Helvetica Neue"/>
+              </a:rPr>
+              <a:t>.</a:t>
+            </a:r>
+            <a:endParaRPr lang="en-US" sz="2800" dirty="0"/>
           </a:p>
         </p:txBody>
       </p:sp>
     </p:spTree>
     <p:extLst>
       <p:ext uri="{BB962C8B-B14F-4D97-AF65-F5344CB8AC3E}">
-        <p14:creationId xmlns:p14="http://schemas.microsoft.com/office/powerpoint/2010/main" val="603180427"/>
+        <p14:creationId xmlns:p14="http://schemas.microsoft.com/office/powerpoint/2010/main" val="992587649"/>
       </p:ext>
     </p:extLst>
   </p:cSld>
@@ -4190,7 +4272,7 @@
           <p:cNvPr id="2" name="Title 1">
             <a:extLst>
               <a:ext uri="{FF2B5EF4-FFF2-40B4-BE49-F238E27FC236}">
-                <a16:creationId xmlns:a16="http://schemas.microsoft.com/office/drawing/2014/main" id="{A52FAFE4-A0D2-4ABD-8EF7-B6D2C0529663}"/>
+                <a16:creationId xmlns:a16="http://schemas.microsoft.com/office/drawing/2014/main" id="{3A9B947D-EC87-45C7-898E-B45223553C30}"/>
               </a:ext>
             </a:extLst>
           </p:cNvPr>
@@ -4208,7 +4290,7 @@
           <a:p>
             <a:r>
               <a:rPr lang="en-US" dirty="0"/>
-              <a:t>The FAULTS!!</a:t>
+              <a:t>Our aim:</a:t>
             </a:r>
           </a:p>
         </p:txBody>
@@ -4218,7 +4300,7 @@
           <p:cNvPr id="3" name="Content Placeholder 2">
             <a:extLst>
               <a:ext uri="{FF2B5EF4-FFF2-40B4-BE49-F238E27FC236}">
-                <a16:creationId xmlns:a16="http://schemas.microsoft.com/office/drawing/2014/main" id="{E3758C72-8A76-4D59-B956-664D8F0B6E07}"/>
+                <a16:creationId xmlns:a16="http://schemas.microsoft.com/office/drawing/2014/main" id="{EB73CC94-16EC-415A-B7A1-942E3317D5AA}"/>
               </a:ext>
             </a:extLst>
           </p:cNvPr>
@@ -4236,38 +4318,12 @@
           </a:bodyPr>
           <a:lstStyle/>
           <a:p>
+            <a:pPr marL="201168" lvl="1" indent="0">
+              <a:buNone/>
+            </a:pPr>
             <a:r>
               <a:rPr lang="en-US" sz="2800" dirty="0"/>
-              <a:t>The sensors that were faulty are:</a:t>
-            </a:r>
-          </a:p>
-          <a:p>
-            <a:pPr lvl="8"/>
-            <a:r>
-              <a:rPr lang="en-US" sz="2800" dirty="0"/>
-              <a:t>1. </a:t>
-            </a:r>
-            <a:r>
-              <a:rPr lang="en-US" sz="2800" dirty="0" err="1"/>
-              <a:t>wifi</a:t>
-            </a:r>
-            <a:r>
-              <a:rPr lang="en-US" sz="2800" dirty="0"/>
-              <a:t> router(Esp8266)</a:t>
-            </a:r>
-          </a:p>
-          <a:p>
-            <a:pPr lvl="8"/>
-            <a:r>
-              <a:rPr lang="en-US" sz="2800" dirty="0"/>
-              <a:t>2.pressure sensor</a:t>
-            </a:r>
-          </a:p>
-          <a:p>
-            <a:pPr lvl="8"/>
-            <a:r>
-              <a:rPr lang="en-US" sz="2800" dirty="0"/>
-              <a:t>3. coin vibration</a:t>
+              <a:t>Weather is the part and parcel in our day to day life. We all need the day to day update of the weather. This can be very beneficial for many who depend on weather information as part of their everyday lives like farmers, outdoorsy types and many weather enthusiasts . Our aim was simple , to make a mini weather station using the sensors at an affordable price . </a:t>
             </a:r>
           </a:p>
         </p:txBody>
@@ -4275,7 +4331,7 @@
     </p:spTree>
     <p:extLst>
       <p:ext uri="{BB962C8B-B14F-4D97-AF65-F5344CB8AC3E}">
-        <p14:creationId xmlns:p14="http://schemas.microsoft.com/office/powerpoint/2010/main" val="3547787400"/>
+        <p14:creationId xmlns:p14="http://schemas.microsoft.com/office/powerpoint/2010/main" val="603180427"/>
       </p:ext>
     </p:extLst>
   </p:cSld>
@@ -4319,7 +4375,7 @@
           <p:cNvPr id="2" name="Title 1">
             <a:extLst>
               <a:ext uri="{FF2B5EF4-FFF2-40B4-BE49-F238E27FC236}">
-                <a16:creationId xmlns:a16="http://schemas.microsoft.com/office/drawing/2014/main" id="{71A2B640-D9B2-419F-8806-DB1C50BC5192}"/>
+                <a16:creationId xmlns:a16="http://schemas.microsoft.com/office/drawing/2014/main" id="{A52FAFE4-A0D2-4ABD-8EF7-B6D2C0529663}"/>
               </a:ext>
             </a:extLst>
           </p:cNvPr>
@@ -4337,58 +4393,74 @@
           <a:p>
             <a:r>
               <a:rPr lang="en-US" dirty="0"/>
-              <a:t>Trello board (updated on 21</a:t>
-            </a:r>
-            <a:r>
-              <a:rPr lang="en-US" baseline="30000" dirty="0"/>
-              <a:t>st</a:t>
-            </a:r>
-            <a:r>
-              <a:rPr lang="en-US" dirty="0"/>
-              <a:t> December)</a:t>
-            </a:r>
-          </a:p>
-        </p:txBody>
-      </p:sp>
-      <p:pic>
-        <p:nvPicPr>
-          <p:cNvPr id="5" name="Content Placeholder 4">
+              <a:t>The FAULTS!!</a:t>
+            </a:r>
+          </a:p>
+        </p:txBody>
+      </p:sp>
+      <p:sp>
+        <p:nvSpPr>
+          <p:cNvPr id="3" name="Content Placeholder 2">
             <a:extLst>
               <a:ext uri="{FF2B5EF4-FFF2-40B4-BE49-F238E27FC236}">
-                <a16:creationId xmlns:a16="http://schemas.microsoft.com/office/drawing/2014/main" id="{5A74061D-1139-44D1-AB38-D8D3B3350C8E}"/>
+                <a16:creationId xmlns:a16="http://schemas.microsoft.com/office/drawing/2014/main" id="{E3758C72-8A76-4D59-B956-664D8F0B6E07}"/>
               </a:ext>
             </a:extLst>
           </p:cNvPr>
-          <p:cNvPicPr>
-            <a:picLocks noGrp="1" noChangeAspect="1"/>
-          </p:cNvPicPr>
+          <p:cNvSpPr>
+            <a:spLocks noGrp="1"/>
+          </p:cNvSpPr>
           <p:nvPr>
             <p:ph idx="1"/>
           </p:nvPr>
-        </p:nvPicPr>
-        <p:blipFill>
-          <a:blip r:embed="rId2">
-            <a:extLst>
-              <a:ext uri="{28A0092B-C50C-407E-A947-70E740481C1C}">
-                <a14:useLocalDpi xmlns:a14="http://schemas.microsoft.com/office/drawing/2010/main" val="0"/>
-              </a:ext>
-            </a:extLst>
-          </a:blip>
-          <a:stretch>
-            <a:fillRect/>
-          </a:stretch>
-        </p:blipFill>
-        <p:spPr>
-          <a:xfrm>
-            <a:off x="1097280" y="1799561"/>
-            <a:ext cx="10058400" cy="4069428"/>
-          </a:xfrm>
-        </p:spPr>
-      </p:pic>
+        </p:nvSpPr>
+        <p:spPr/>
+        <p:txBody>
+          <a:bodyPr>
+            <a:normAutofit/>
+          </a:bodyPr>
+          <a:lstStyle/>
+          <a:p>
+            <a:r>
+              <a:rPr lang="en-US" sz="2800" dirty="0"/>
+              <a:t>The sensors that were faulty are:</a:t>
+            </a:r>
+          </a:p>
+          <a:p>
+            <a:pPr lvl="8"/>
+            <a:r>
+              <a:rPr lang="en-US" sz="2800" dirty="0"/>
+              <a:t>1. </a:t>
+            </a:r>
+            <a:r>
+              <a:rPr lang="en-US" sz="2800" dirty="0" err="1"/>
+              <a:t>wifi</a:t>
+            </a:r>
+            <a:r>
+              <a:rPr lang="en-US" sz="2800" dirty="0"/>
+              <a:t> router(Esp8266)</a:t>
+            </a:r>
+          </a:p>
+          <a:p>
+            <a:pPr lvl="8"/>
+            <a:r>
+              <a:rPr lang="en-US" sz="2800" dirty="0"/>
+              <a:t>2.pressure sensor</a:t>
+            </a:r>
+          </a:p>
+          <a:p>
+            <a:pPr lvl="8"/>
+            <a:r>
+              <a:rPr lang="en-US" sz="2800" dirty="0"/>
+              <a:t>3. coin vibration</a:t>
+            </a:r>
+          </a:p>
+        </p:txBody>
+      </p:sp>
     </p:spTree>
     <p:extLst>
       <p:ext uri="{BB962C8B-B14F-4D97-AF65-F5344CB8AC3E}">
-        <p14:creationId xmlns:p14="http://schemas.microsoft.com/office/powerpoint/2010/main" val="2214986093"/>
+        <p14:creationId xmlns:p14="http://schemas.microsoft.com/office/powerpoint/2010/main" val="3547787400"/>
       </p:ext>
     </p:extLst>
   </p:cSld>
@@ -4432,7 +4504,7 @@
           <p:cNvPr id="2" name="Title 1">
             <a:extLst>
               <a:ext uri="{FF2B5EF4-FFF2-40B4-BE49-F238E27FC236}">
-                <a16:creationId xmlns:a16="http://schemas.microsoft.com/office/drawing/2014/main" id="{76FB7074-FF8B-49F5-B41D-9164A6229762}"/>
+                <a16:creationId xmlns:a16="http://schemas.microsoft.com/office/drawing/2014/main" id="{71A2B640-D9B2-419F-8806-DB1C50BC5192}"/>
               </a:ext>
             </a:extLst>
           </p:cNvPr>
@@ -4450,7 +4522,7 @@
           <a:p>
             <a:r>
               <a:rPr lang="en-US" dirty="0"/>
-              <a:t>Slack (updated on 21</a:t>
+              <a:t>Trello board (updated on 21</a:t>
             </a:r>
             <a:r>
               <a:rPr lang="en-US" baseline="30000" dirty="0"/>
@@ -4468,7 +4540,7 @@
           <p:cNvPr id="5" name="Content Placeholder 4">
             <a:extLst>
               <a:ext uri="{FF2B5EF4-FFF2-40B4-BE49-F238E27FC236}">
-                <a16:creationId xmlns:a16="http://schemas.microsoft.com/office/drawing/2014/main" id="{895D0FB4-3C74-4DBF-9B2D-F19E8206F751}"/>
+                <a16:creationId xmlns:a16="http://schemas.microsoft.com/office/drawing/2014/main" id="{5A74061D-1139-44D1-AB38-D8D3B3350C8E}"/>
               </a:ext>
             </a:extLst>
           </p:cNvPr>
@@ -4493,15 +4565,15 @@
         </p:blipFill>
         <p:spPr>
           <a:xfrm>
-            <a:off x="1097280" y="1858261"/>
-            <a:ext cx="10058399" cy="4169753"/>
+            <a:off x="1097280" y="1799561"/>
+            <a:ext cx="10058400" cy="4069428"/>
           </a:xfrm>
         </p:spPr>
       </p:pic>
     </p:spTree>
     <p:extLst>
       <p:ext uri="{BB962C8B-B14F-4D97-AF65-F5344CB8AC3E}">
-        <p14:creationId xmlns:p14="http://schemas.microsoft.com/office/powerpoint/2010/main" val="911943158"/>
+        <p14:creationId xmlns:p14="http://schemas.microsoft.com/office/powerpoint/2010/main" val="2214986093"/>
       </p:ext>
     </p:extLst>
   </p:cSld>
@@ -4545,7 +4617,7 @@
           <p:cNvPr id="2" name="Title 1">
             <a:extLst>
               <a:ext uri="{FF2B5EF4-FFF2-40B4-BE49-F238E27FC236}">
-                <a16:creationId xmlns:a16="http://schemas.microsoft.com/office/drawing/2014/main" id="{61827DA4-8BC0-4BF9-8541-C936D23557F0}"/>
+                <a16:creationId xmlns:a16="http://schemas.microsoft.com/office/drawing/2014/main" id="{76FB7074-FF8B-49F5-B41D-9164A6229762}"/>
               </a:ext>
             </a:extLst>
           </p:cNvPr>
@@ -4562,12 +4634,8 @@
           <a:lstStyle/>
           <a:p>
             <a:r>
-              <a:rPr lang="en-US" dirty="0" err="1"/>
-              <a:t>Github</a:t>
-            </a:r>
-            <a:r>
               <a:rPr lang="en-US" dirty="0"/>
-              <a:t> (updated on 21</a:t>
+              <a:t>Slack (updated on 21</a:t>
             </a:r>
             <a:r>
               <a:rPr lang="en-US" baseline="30000" dirty="0"/>
@@ -4585,7 +4653,7 @@
           <p:cNvPr id="5" name="Content Placeholder 4">
             <a:extLst>
               <a:ext uri="{FF2B5EF4-FFF2-40B4-BE49-F238E27FC236}">
-                <a16:creationId xmlns:a16="http://schemas.microsoft.com/office/drawing/2014/main" id="{E2A8AAA7-8990-4817-9D62-CE9B61998F34}"/>
+                <a16:creationId xmlns:a16="http://schemas.microsoft.com/office/drawing/2014/main" id="{895D0FB4-3C74-4DBF-9B2D-F19E8206F751}"/>
               </a:ext>
             </a:extLst>
           </p:cNvPr>
@@ -4610,15 +4678,15 @@
         </p:blipFill>
         <p:spPr>
           <a:xfrm>
-            <a:off x="1563758" y="1999068"/>
-            <a:ext cx="8703048" cy="4134963"/>
+            <a:off x="1097280" y="1858261"/>
+            <a:ext cx="10058399" cy="4169753"/>
           </a:xfrm>
         </p:spPr>
       </p:pic>
     </p:spTree>
     <p:extLst>
       <p:ext uri="{BB962C8B-B14F-4D97-AF65-F5344CB8AC3E}">
-        <p14:creationId xmlns:p14="http://schemas.microsoft.com/office/powerpoint/2010/main" val="282220433"/>
+        <p14:creationId xmlns:p14="http://schemas.microsoft.com/office/powerpoint/2010/main" val="911943158"/>
       </p:ext>
     </p:extLst>
   </p:cSld>
@@ -4662,7 +4730,7 @@
           <p:cNvPr id="2" name="Title 1">
             <a:extLst>
               <a:ext uri="{FF2B5EF4-FFF2-40B4-BE49-F238E27FC236}">
-                <a16:creationId xmlns:a16="http://schemas.microsoft.com/office/drawing/2014/main" id="{E6B8DDFC-1D0E-4CEA-9D71-A1DDA0F72733}"/>
+                <a16:creationId xmlns:a16="http://schemas.microsoft.com/office/drawing/2014/main" id="{61827DA4-8BC0-4BF9-8541-C936D23557F0}"/>
               </a:ext>
             </a:extLst>
           </p:cNvPr>
@@ -4684,7 +4752,7 @@
             </a:r>
             <a:r>
               <a:rPr lang="en-US" dirty="0"/>
-              <a:t> files(updated on 21</a:t>
+              <a:t> (updated on 21</a:t>
             </a:r>
             <a:r>
               <a:rPr lang="en-US" baseline="30000" dirty="0"/>
@@ -4702,7 +4770,7 @@
           <p:cNvPr id="5" name="Content Placeholder 4">
             <a:extLst>
               <a:ext uri="{FF2B5EF4-FFF2-40B4-BE49-F238E27FC236}">
-                <a16:creationId xmlns:a16="http://schemas.microsoft.com/office/drawing/2014/main" id="{F21F2D40-83BD-4C86-9AEF-BCC92576F461}"/>
+                <a16:creationId xmlns:a16="http://schemas.microsoft.com/office/drawing/2014/main" id="{E2A8AAA7-8990-4817-9D62-CE9B61998F34}"/>
               </a:ext>
             </a:extLst>
           </p:cNvPr>
@@ -4727,15 +4795,15 @@
         </p:blipFill>
         <p:spPr>
           <a:xfrm>
-            <a:off x="1097278" y="1865513"/>
-            <a:ext cx="10058401" cy="4003475"/>
+            <a:off x="1563758" y="1999068"/>
+            <a:ext cx="8703048" cy="4134963"/>
           </a:xfrm>
         </p:spPr>
       </p:pic>
     </p:spTree>
     <p:extLst>
       <p:ext uri="{BB962C8B-B14F-4D97-AF65-F5344CB8AC3E}">
-        <p14:creationId xmlns:p14="http://schemas.microsoft.com/office/powerpoint/2010/main" val="688933493"/>
+        <p14:creationId xmlns:p14="http://schemas.microsoft.com/office/powerpoint/2010/main" val="282220433"/>
       </p:ext>
     </p:extLst>
   </p:cSld>
@@ -4779,6 +4847,123 @@
           <p:cNvPr id="2" name="Title 1">
             <a:extLst>
               <a:ext uri="{FF2B5EF4-FFF2-40B4-BE49-F238E27FC236}">
+                <a16:creationId xmlns:a16="http://schemas.microsoft.com/office/drawing/2014/main" id="{E6B8DDFC-1D0E-4CEA-9D71-A1DDA0F72733}"/>
+              </a:ext>
+            </a:extLst>
+          </p:cNvPr>
+          <p:cNvSpPr>
+            <a:spLocks noGrp="1"/>
+          </p:cNvSpPr>
+          <p:nvPr>
+            <p:ph type="title"/>
+          </p:nvPr>
+        </p:nvSpPr>
+        <p:spPr/>
+        <p:txBody>
+          <a:bodyPr/>
+          <a:lstStyle/>
+          <a:p>
+            <a:r>
+              <a:rPr lang="en-US" dirty="0" err="1"/>
+              <a:t>Github</a:t>
+            </a:r>
+            <a:r>
+              <a:rPr lang="en-US" dirty="0"/>
+              <a:t> files(updated on 21</a:t>
+            </a:r>
+            <a:r>
+              <a:rPr lang="en-US" baseline="30000" dirty="0"/>
+              <a:t>st</a:t>
+            </a:r>
+            <a:r>
+              <a:rPr lang="en-US" dirty="0"/>
+              <a:t> December)</a:t>
+            </a:r>
+          </a:p>
+        </p:txBody>
+      </p:sp>
+      <p:pic>
+        <p:nvPicPr>
+          <p:cNvPr id="5" name="Content Placeholder 4">
+            <a:extLst>
+              <a:ext uri="{FF2B5EF4-FFF2-40B4-BE49-F238E27FC236}">
+                <a16:creationId xmlns:a16="http://schemas.microsoft.com/office/drawing/2014/main" id="{F21F2D40-83BD-4C86-9AEF-BCC92576F461}"/>
+              </a:ext>
+            </a:extLst>
+          </p:cNvPr>
+          <p:cNvPicPr>
+            <a:picLocks noGrp="1" noChangeAspect="1"/>
+          </p:cNvPicPr>
+          <p:nvPr>
+            <p:ph idx="1"/>
+          </p:nvPr>
+        </p:nvPicPr>
+        <p:blipFill>
+          <a:blip r:embed="rId2">
+            <a:extLst>
+              <a:ext uri="{28A0092B-C50C-407E-A947-70E740481C1C}">
+                <a14:useLocalDpi xmlns:a14="http://schemas.microsoft.com/office/drawing/2010/main" val="0"/>
+              </a:ext>
+            </a:extLst>
+          </a:blip>
+          <a:stretch>
+            <a:fillRect/>
+          </a:stretch>
+        </p:blipFill>
+        <p:spPr>
+          <a:xfrm>
+            <a:off x="1097278" y="1865513"/>
+            <a:ext cx="10058401" cy="4003475"/>
+          </a:xfrm>
+        </p:spPr>
+      </p:pic>
+    </p:spTree>
+    <p:extLst>
+      <p:ext uri="{BB962C8B-B14F-4D97-AF65-F5344CB8AC3E}">
+        <p14:creationId xmlns:p14="http://schemas.microsoft.com/office/powerpoint/2010/main" val="688933493"/>
+      </p:ext>
+    </p:extLst>
+  </p:cSld>
+  <p:clrMapOvr>
+    <a:masterClrMapping/>
+  </p:clrMapOvr>
+  <mc:AlternateContent xmlns:mc="http://schemas.openxmlformats.org/markup-compatibility/2006" xmlns:p14="http://schemas.microsoft.com/office/powerpoint/2010/main">
+    <mc:Choice Requires="p14">
+      <p:transition spd="slow" p14:dur="1250">
+        <p14:switch dir="r"/>
+      </p:transition>
+    </mc:Choice>
+    <mc:Fallback xmlns="">
+      <p:transition spd="slow">
+        <p:fade/>
+      </p:transition>
+    </mc:Fallback>
+  </mc:AlternateContent>
+</p:sld>
+</file>
+
+<file path=ppt/slides/slide17.xml><?xml version="1.0" encoding="utf-8"?>
+<p:sld xmlns:a="http://schemas.openxmlformats.org/drawingml/2006/main" xmlns:r="http://schemas.openxmlformats.org/officeDocument/2006/relationships" xmlns:p="http://schemas.openxmlformats.org/presentationml/2006/main">
+  <p:cSld>
+    <p:spTree>
+      <p:nvGrpSpPr>
+        <p:cNvPr id="1" name=""/>
+        <p:cNvGrpSpPr/>
+        <p:nvPr/>
+      </p:nvGrpSpPr>
+      <p:grpSpPr>
+        <a:xfrm>
+          <a:off x="0" y="0"/>
+          <a:ext cx="0" cy="0"/>
+          <a:chOff x="0" y="0"/>
+          <a:chExt cx="0" cy="0"/>
+        </a:xfrm>
+      </p:grpSpPr>
+      <p:sp>
+        <p:nvSpPr>
+          <p:cNvPr id="2" name="Title 1">
+            <a:extLst>
+              <a:ext uri="{FF2B5EF4-FFF2-40B4-BE49-F238E27FC236}">
                 <a16:creationId xmlns:a16="http://schemas.microsoft.com/office/drawing/2014/main" id="{C1F7E1EC-3F11-4BB8-9F5E-ACEE7C0B97F5}"/>
               </a:ext>
             </a:extLst>
@@ -4874,7 +5059,7 @@
 </p:sld>
 </file>
 
-<file path=ppt/slides/slide17.xml><?xml version="1.0" encoding="utf-8"?>
+<file path=ppt/slides/slide18.xml><?xml version="1.0" encoding="utf-8"?>
 <p:sld xmlns:a="http://schemas.openxmlformats.org/drawingml/2006/main" xmlns:r="http://schemas.openxmlformats.org/officeDocument/2006/relationships" xmlns:p="http://schemas.openxmlformats.org/presentationml/2006/main">
   <p:cSld>
     <p:spTree>
@@ -5265,138 +5450,6 @@
 </p:sld>
 </file>
 
-<file path=ppt/slides/slide18.xml><?xml version="1.0" encoding="utf-8"?>
-<p:sld xmlns:a="http://schemas.openxmlformats.org/drawingml/2006/main" xmlns:r="http://schemas.openxmlformats.org/officeDocument/2006/relationships" xmlns:p="http://schemas.openxmlformats.org/presentationml/2006/main">
-  <p:cSld>
-    <p:spTree>
-      <p:nvGrpSpPr>
-        <p:cNvPr id="1" name=""/>
-        <p:cNvGrpSpPr/>
-        <p:nvPr/>
-      </p:nvGrpSpPr>
-      <p:grpSpPr>
-        <a:xfrm>
-          <a:off x="0" y="0"/>
-          <a:ext cx="0" cy="0"/>
-          <a:chOff x="0" y="0"/>
-          <a:chExt cx="0" cy="0"/>
-        </a:xfrm>
-      </p:grpSpPr>
-      <p:sp>
-        <p:nvSpPr>
-          <p:cNvPr id="2" name="Title 1">
-            <a:extLst>
-              <a:ext uri="{FF2B5EF4-FFF2-40B4-BE49-F238E27FC236}">
-                <a16:creationId xmlns:a16="http://schemas.microsoft.com/office/drawing/2014/main" id="{90771C22-5EE9-4661-A7F4-E2FDF253E035}"/>
-              </a:ext>
-            </a:extLst>
-          </p:cNvPr>
-          <p:cNvSpPr>
-            <a:spLocks noGrp="1"/>
-          </p:cNvSpPr>
-          <p:nvPr>
-            <p:ph type="title"/>
-          </p:nvPr>
-        </p:nvSpPr>
-        <p:spPr/>
-        <p:txBody>
-          <a:bodyPr/>
-          <a:lstStyle/>
-          <a:p>
-            <a:r>
-              <a:rPr lang="en-US" dirty="0"/>
-              <a:t>In air conditioned room:</a:t>
-            </a:r>
-          </a:p>
-        </p:txBody>
-      </p:sp>
-      <p:pic>
-        <p:nvPicPr>
-          <p:cNvPr id="11" name="Content Placeholder 10">
-            <a:extLst>
-              <a:ext uri="{FF2B5EF4-FFF2-40B4-BE49-F238E27FC236}">
-                <a16:creationId xmlns:a16="http://schemas.microsoft.com/office/drawing/2014/main" id="{6F27C8F9-2ED7-4A8C-B4BB-D5D25A015DBD}"/>
-              </a:ext>
-            </a:extLst>
-          </p:cNvPr>
-          <p:cNvPicPr>
-            <a:picLocks noGrp="1" noChangeAspect="1"/>
-          </p:cNvPicPr>
-          <p:nvPr>
-            <p:ph idx="1"/>
-          </p:nvPr>
-        </p:nvPicPr>
-        <p:blipFill>
-          <a:blip r:embed="rId2">
-            <a:extLst>
-              <a:ext uri="{28A0092B-C50C-407E-A947-70E740481C1C}">
-                <a14:useLocalDpi xmlns:a14="http://schemas.microsoft.com/office/drawing/2010/main" val="0"/>
-              </a:ext>
-            </a:extLst>
-          </a:blip>
-          <a:stretch>
-            <a:fillRect/>
-          </a:stretch>
-        </p:blipFill>
-        <p:spPr>
-          <a:xfrm>
-            <a:off x="1203297" y="1843377"/>
-            <a:ext cx="4892703" cy="3815301"/>
-          </a:xfrm>
-        </p:spPr>
-      </p:pic>
-      <p:pic>
-        <p:nvPicPr>
-          <p:cNvPr id="13" name="Picture 12">
-            <a:extLst>
-              <a:ext uri="{FF2B5EF4-FFF2-40B4-BE49-F238E27FC236}">
-                <a16:creationId xmlns:a16="http://schemas.microsoft.com/office/drawing/2014/main" id="{40A08176-BF83-40AF-819E-88409284D726}"/>
-              </a:ext>
-            </a:extLst>
-          </p:cNvPr>
-          <p:cNvPicPr>
-            <a:picLocks noChangeAspect="1"/>
-          </p:cNvPicPr>
-          <p:nvPr/>
-        </p:nvPicPr>
-        <p:blipFill>
-          <a:blip r:embed="rId3">
-            <a:extLst>
-              <a:ext uri="{28A0092B-C50C-407E-A947-70E740481C1C}">
-                <a14:useLocalDpi xmlns:a14="http://schemas.microsoft.com/office/drawing/2010/main" val="0"/>
-              </a:ext>
-            </a:extLst>
-          </a:blip>
-          <a:stretch>
-            <a:fillRect/>
-          </a:stretch>
-        </p:blipFill>
-        <p:spPr>
-          <a:xfrm>
-            <a:off x="5878374" y="1843377"/>
-            <a:ext cx="6072407" cy="4027336"/>
-          </a:xfrm>
-          <a:prstGeom prst="rect">
-            <a:avLst/>
-          </a:prstGeom>
-        </p:spPr>
-      </p:pic>
-    </p:spTree>
-    <p:extLst>
-      <p:ext uri="{BB962C8B-B14F-4D97-AF65-F5344CB8AC3E}">
-        <p14:creationId xmlns:p14="http://schemas.microsoft.com/office/powerpoint/2010/main" val="3444360951"/>
-      </p:ext>
-    </p:extLst>
-  </p:cSld>
-  <p:clrMapOvr>
-    <a:masterClrMapping/>
-  </p:clrMapOvr>
-  <p:transition spd="slow">
-    <p:push dir="u"/>
-  </p:transition>
-</p:sld>
-</file>
-
 <file path=ppt/slides/slide19.xml><?xml version="1.0" encoding="utf-8"?>
 <p:sld xmlns:a="http://schemas.openxmlformats.org/drawingml/2006/main" xmlns:r="http://schemas.openxmlformats.org/officeDocument/2006/relationships" xmlns:p="http://schemas.openxmlformats.org/presentationml/2006/main">
   <p:cSld>
@@ -5419,7 +5472,7 @@
           <p:cNvPr id="2" name="Title 1">
             <a:extLst>
               <a:ext uri="{FF2B5EF4-FFF2-40B4-BE49-F238E27FC236}">
-                <a16:creationId xmlns:a16="http://schemas.microsoft.com/office/drawing/2014/main" id="{38D8BFCF-B72E-47A0-9502-EAA28A08F407}"/>
+                <a16:creationId xmlns:a16="http://schemas.microsoft.com/office/drawing/2014/main" id="{90771C22-5EE9-4661-A7F4-E2FDF253E035}"/>
               </a:ext>
             </a:extLst>
           </p:cNvPr>
@@ -5437,17 +5490,17 @@
           <a:p>
             <a:r>
               <a:rPr lang="en-US" dirty="0"/>
-              <a:t>Air conditioned room (average)</a:t>
+              <a:t>In air conditioned room:</a:t>
             </a:r>
           </a:p>
         </p:txBody>
       </p:sp>
       <p:pic>
         <p:nvPicPr>
-          <p:cNvPr id="5" name="Content Placeholder 4">
+          <p:cNvPr id="11" name="Content Placeholder 10">
             <a:extLst>
               <a:ext uri="{FF2B5EF4-FFF2-40B4-BE49-F238E27FC236}">
-                <a16:creationId xmlns:a16="http://schemas.microsoft.com/office/drawing/2014/main" id="{92C86444-4F7E-4785-9AF0-3E3E68C9B3FF}"/>
+                <a16:creationId xmlns:a16="http://schemas.microsoft.com/office/drawing/2014/main" id="{6F27C8F9-2ED7-4A8C-B4BB-D5D25A015DBD}"/>
               </a:ext>
             </a:extLst>
           </p:cNvPr>
@@ -5472,15 +5525,51 @@
         </p:blipFill>
         <p:spPr>
           <a:xfrm>
-            <a:off x="1173782" y="2176673"/>
-            <a:ext cx="9904762" cy="3361905"/>
-          </a:xfrm>
+            <a:off x="1203297" y="1843377"/>
+            <a:ext cx="4892703" cy="3815301"/>
+          </a:xfrm>
+        </p:spPr>
+      </p:pic>
+      <p:pic>
+        <p:nvPicPr>
+          <p:cNvPr id="13" name="Picture 12">
+            <a:extLst>
+              <a:ext uri="{FF2B5EF4-FFF2-40B4-BE49-F238E27FC236}">
+                <a16:creationId xmlns:a16="http://schemas.microsoft.com/office/drawing/2014/main" id="{40A08176-BF83-40AF-819E-88409284D726}"/>
+              </a:ext>
+            </a:extLst>
+          </p:cNvPr>
+          <p:cNvPicPr>
+            <a:picLocks noChangeAspect="1"/>
+          </p:cNvPicPr>
+          <p:nvPr/>
+        </p:nvPicPr>
+        <p:blipFill>
+          <a:blip r:embed="rId3">
+            <a:extLst>
+              <a:ext uri="{28A0092B-C50C-407E-A947-70E740481C1C}">
+                <a14:useLocalDpi xmlns:a14="http://schemas.microsoft.com/office/drawing/2010/main" val="0"/>
+              </a:ext>
+            </a:extLst>
+          </a:blip>
+          <a:stretch>
+            <a:fillRect/>
+          </a:stretch>
+        </p:blipFill>
+        <p:spPr>
+          <a:xfrm>
+            <a:off x="5878374" y="1843377"/>
+            <a:ext cx="6072407" cy="4027336"/>
+          </a:xfrm>
+          <a:prstGeom prst="rect">
+            <a:avLst/>
+          </a:prstGeom>
         </p:spPr>
       </p:pic>
     </p:spTree>
     <p:extLst>
       <p:ext uri="{BB962C8B-B14F-4D97-AF65-F5344CB8AC3E}">
-        <p14:creationId xmlns:p14="http://schemas.microsoft.com/office/powerpoint/2010/main" val="490335180"/>
+        <p14:creationId xmlns:p14="http://schemas.microsoft.com/office/powerpoint/2010/main" val="3444360951"/>
       </p:ext>
     </p:extLst>
   </p:cSld>
@@ -5646,7 +5735,7 @@
           <p:cNvPr id="2" name="Title 1">
             <a:extLst>
               <a:ext uri="{FF2B5EF4-FFF2-40B4-BE49-F238E27FC236}">
-                <a16:creationId xmlns:a16="http://schemas.microsoft.com/office/drawing/2014/main" id="{2C082C50-F47A-4028-91C2-74FB0FADB52F}"/>
+                <a16:creationId xmlns:a16="http://schemas.microsoft.com/office/drawing/2014/main" id="{38D8BFCF-B72E-47A0-9502-EAA28A08F407}"/>
               </a:ext>
             </a:extLst>
           </p:cNvPr>
@@ -5664,7 +5753,7 @@
           <a:p>
             <a:r>
               <a:rPr lang="en-US" dirty="0"/>
-              <a:t>In normal room:</a:t>
+              <a:t>Air conditioned room (average)</a:t>
             </a:r>
           </a:p>
         </p:txBody>
@@ -5674,7 +5763,7 @@
           <p:cNvPr id="5" name="Content Placeholder 4">
             <a:extLst>
               <a:ext uri="{FF2B5EF4-FFF2-40B4-BE49-F238E27FC236}">
-                <a16:creationId xmlns:a16="http://schemas.microsoft.com/office/drawing/2014/main" id="{FCBE62D5-4F55-4907-BFD1-797E6F05ECC7}"/>
+                <a16:creationId xmlns:a16="http://schemas.microsoft.com/office/drawing/2014/main" id="{92C86444-4F7E-4785-9AF0-3E3E68C9B3FF}"/>
               </a:ext>
             </a:extLst>
           </p:cNvPr>
@@ -5699,51 +5788,15 @@
         </p:blipFill>
         <p:spPr>
           <a:xfrm>
-            <a:off x="1205949" y="1846263"/>
-            <a:ext cx="5169819" cy="4022725"/>
-          </a:xfrm>
-        </p:spPr>
-      </p:pic>
-      <p:pic>
-        <p:nvPicPr>
-          <p:cNvPr id="7" name="Picture 6">
-            <a:extLst>
-              <a:ext uri="{FF2B5EF4-FFF2-40B4-BE49-F238E27FC236}">
-                <a16:creationId xmlns:a16="http://schemas.microsoft.com/office/drawing/2014/main" id="{6521B08B-2DB3-4ABF-91AE-C213D2C0FDA3}"/>
-              </a:ext>
-            </a:extLst>
-          </p:cNvPr>
-          <p:cNvPicPr>
-            <a:picLocks noChangeAspect="1"/>
-          </p:cNvPicPr>
-          <p:nvPr/>
-        </p:nvPicPr>
-        <p:blipFill>
-          <a:blip r:embed="rId3">
-            <a:extLst>
-              <a:ext uri="{28A0092B-C50C-407E-A947-70E740481C1C}">
-                <a14:useLocalDpi xmlns:a14="http://schemas.microsoft.com/office/drawing/2010/main" val="0"/>
-              </a:ext>
-            </a:extLst>
-          </a:blip>
-          <a:stretch>
-            <a:fillRect/>
-          </a:stretch>
-        </p:blipFill>
-        <p:spPr>
-          <a:xfrm>
-            <a:off x="6375768" y="1846263"/>
-            <a:ext cx="5816232" cy="4131628"/>
-          </a:xfrm>
-          <a:prstGeom prst="rect">
-            <a:avLst/>
-          </a:prstGeom>
+            <a:off x="1173782" y="2176673"/>
+            <a:ext cx="9904762" cy="3361905"/>
+          </a:xfrm>
         </p:spPr>
       </p:pic>
     </p:spTree>
     <p:extLst>
       <p:ext uri="{BB962C8B-B14F-4D97-AF65-F5344CB8AC3E}">
-        <p14:creationId xmlns:p14="http://schemas.microsoft.com/office/powerpoint/2010/main" val="2366440430"/>
+        <p14:creationId xmlns:p14="http://schemas.microsoft.com/office/powerpoint/2010/main" val="490335180"/>
       </p:ext>
     </p:extLst>
   </p:cSld>
@@ -5778,7 +5831,7 @@
           <p:cNvPr id="2" name="Title 1">
             <a:extLst>
               <a:ext uri="{FF2B5EF4-FFF2-40B4-BE49-F238E27FC236}">
-                <a16:creationId xmlns:a16="http://schemas.microsoft.com/office/drawing/2014/main" id="{D54B714C-DB1A-44DA-8786-8F67EEED826A}"/>
+                <a16:creationId xmlns:a16="http://schemas.microsoft.com/office/drawing/2014/main" id="{2C082C50-F47A-4028-91C2-74FB0FADB52F}"/>
               </a:ext>
             </a:extLst>
           </p:cNvPr>
@@ -5796,7 +5849,7 @@
           <a:p>
             <a:r>
               <a:rPr lang="en-US" dirty="0"/>
-              <a:t>In normal room (average)</a:t>
+              <a:t>In normal room:</a:t>
             </a:r>
           </a:p>
         </p:txBody>
@@ -5806,7 +5859,7 @@
           <p:cNvPr id="5" name="Content Placeholder 4">
             <a:extLst>
               <a:ext uri="{FF2B5EF4-FFF2-40B4-BE49-F238E27FC236}">
-                <a16:creationId xmlns:a16="http://schemas.microsoft.com/office/drawing/2014/main" id="{38C27974-29DF-416B-87AB-4C725B01DF5C}"/>
+                <a16:creationId xmlns:a16="http://schemas.microsoft.com/office/drawing/2014/main" id="{FCBE62D5-4F55-4907-BFD1-797E6F05ECC7}"/>
               </a:ext>
             </a:extLst>
           </p:cNvPr>
@@ -5831,8 +5884,8 @@
         </p:blipFill>
         <p:spPr>
           <a:xfrm>
-            <a:off x="1905524" y="1873236"/>
-            <a:ext cx="8380952" cy="1980952"/>
+            <a:off x="1205949" y="1846263"/>
+            <a:ext cx="5169819" cy="4022725"/>
           </a:xfrm>
         </p:spPr>
       </p:pic>
@@ -5841,7 +5894,7 @@
           <p:cNvPr id="7" name="Picture 6">
             <a:extLst>
               <a:ext uri="{FF2B5EF4-FFF2-40B4-BE49-F238E27FC236}">
-                <a16:creationId xmlns:a16="http://schemas.microsoft.com/office/drawing/2014/main" id="{3BBE43E5-1191-4772-88D7-5ACB38451A7A}"/>
+                <a16:creationId xmlns:a16="http://schemas.microsoft.com/office/drawing/2014/main" id="{6521B08B-2DB3-4ABF-91AE-C213D2C0FDA3}"/>
               </a:ext>
             </a:extLst>
           </p:cNvPr>
@@ -5864,8 +5917,8 @@
         </p:blipFill>
         <p:spPr>
           <a:xfrm>
-            <a:off x="1812759" y="3990064"/>
-            <a:ext cx="7895238" cy="1990476"/>
+            <a:off x="6375768" y="1846263"/>
+            <a:ext cx="5816232" cy="4131628"/>
           </a:xfrm>
           <a:prstGeom prst="rect">
             <a:avLst/>
@@ -5875,7 +5928,7 @@
     </p:spTree>
     <p:extLst>
       <p:ext uri="{BB962C8B-B14F-4D97-AF65-F5344CB8AC3E}">
-        <p14:creationId xmlns:p14="http://schemas.microsoft.com/office/powerpoint/2010/main" val="1982346416"/>
+        <p14:creationId xmlns:p14="http://schemas.microsoft.com/office/powerpoint/2010/main" val="2366440430"/>
       </p:ext>
     </p:extLst>
   </p:cSld>
@@ -5910,7 +5963,7 @@
           <p:cNvPr id="2" name="Title 1">
             <a:extLst>
               <a:ext uri="{FF2B5EF4-FFF2-40B4-BE49-F238E27FC236}">
-                <a16:creationId xmlns:a16="http://schemas.microsoft.com/office/drawing/2014/main" id="{5C17E416-F04C-41C2-8C0E-8A0169841E5E}"/>
+                <a16:creationId xmlns:a16="http://schemas.microsoft.com/office/drawing/2014/main" id="{D54B714C-DB1A-44DA-8786-8F67EEED826A}"/>
               </a:ext>
             </a:extLst>
           </p:cNvPr>
@@ -5928,7 +5981,7 @@
           <a:p>
             <a:r>
               <a:rPr lang="en-US" dirty="0"/>
-              <a:t>In kitchen :</a:t>
+              <a:t>In normal room (average)</a:t>
             </a:r>
           </a:p>
         </p:txBody>
@@ -5938,7 +5991,7 @@
           <p:cNvPr id="5" name="Content Placeholder 4">
             <a:extLst>
               <a:ext uri="{FF2B5EF4-FFF2-40B4-BE49-F238E27FC236}">
-                <a16:creationId xmlns:a16="http://schemas.microsoft.com/office/drawing/2014/main" id="{D2684125-3EF9-426F-B167-D574AC6E9263}"/>
+                <a16:creationId xmlns:a16="http://schemas.microsoft.com/office/drawing/2014/main" id="{38C27974-29DF-416B-87AB-4C725B01DF5C}"/>
               </a:ext>
             </a:extLst>
           </p:cNvPr>
@@ -5963,8 +6016,8 @@
         </p:blipFill>
         <p:spPr>
           <a:xfrm>
-            <a:off x="1097280" y="1872767"/>
-            <a:ext cx="4859219" cy="3812415"/>
+            <a:off x="1905524" y="1873236"/>
+            <a:ext cx="8380952" cy="1980952"/>
           </a:xfrm>
         </p:spPr>
       </p:pic>
@@ -5973,7 +6026,7 @@
           <p:cNvPr id="7" name="Picture 6">
             <a:extLst>
               <a:ext uri="{FF2B5EF4-FFF2-40B4-BE49-F238E27FC236}">
-                <a16:creationId xmlns:a16="http://schemas.microsoft.com/office/drawing/2014/main" id="{8C3551D9-B0B5-49E0-9BC8-BDC253743B24}"/>
+                <a16:creationId xmlns:a16="http://schemas.microsoft.com/office/drawing/2014/main" id="{3BBE43E5-1191-4772-88D7-5ACB38451A7A}"/>
               </a:ext>
             </a:extLst>
           </p:cNvPr>
@@ -5996,8 +6049,8 @@
         </p:blipFill>
         <p:spPr>
           <a:xfrm>
-            <a:off x="5579164" y="1872767"/>
-            <a:ext cx="6612835" cy="4294328"/>
+            <a:off x="1812759" y="3990064"/>
+            <a:ext cx="7895238" cy="1990476"/>
           </a:xfrm>
           <a:prstGeom prst="rect">
             <a:avLst/>
@@ -6007,7 +6060,7 @@
     </p:spTree>
     <p:extLst>
       <p:ext uri="{BB962C8B-B14F-4D97-AF65-F5344CB8AC3E}">
-        <p14:creationId xmlns:p14="http://schemas.microsoft.com/office/powerpoint/2010/main" val="2085122517"/>
+        <p14:creationId xmlns:p14="http://schemas.microsoft.com/office/powerpoint/2010/main" val="1982346416"/>
       </p:ext>
     </p:extLst>
   </p:cSld>
@@ -6042,7 +6095,7 @@
           <p:cNvPr id="2" name="Title 1">
             <a:extLst>
               <a:ext uri="{FF2B5EF4-FFF2-40B4-BE49-F238E27FC236}">
-                <a16:creationId xmlns:a16="http://schemas.microsoft.com/office/drawing/2014/main" id="{BD4BA410-5B4B-45AC-9306-A4A730D72534}"/>
+                <a16:creationId xmlns:a16="http://schemas.microsoft.com/office/drawing/2014/main" id="{5C17E416-F04C-41C2-8C0E-8A0169841E5E}"/>
               </a:ext>
             </a:extLst>
           </p:cNvPr>
@@ -6060,7 +6113,7 @@
           <a:p>
             <a:r>
               <a:rPr lang="en-US" dirty="0"/>
-              <a:t>In kitchen (average):</a:t>
+              <a:t>In kitchen :</a:t>
             </a:r>
           </a:p>
         </p:txBody>
@@ -6070,7 +6123,7 @@
           <p:cNvPr id="5" name="Content Placeholder 4">
             <a:extLst>
               <a:ext uri="{FF2B5EF4-FFF2-40B4-BE49-F238E27FC236}">
-                <a16:creationId xmlns:a16="http://schemas.microsoft.com/office/drawing/2014/main" id="{D66DAE00-CD2A-49BB-B45D-0E2064101114}"/>
+                <a16:creationId xmlns:a16="http://schemas.microsoft.com/office/drawing/2014/main" id="{D2684125-3EF9-426F-B167-D574AC6E9263}"/>
               </a:ext>
             </a:extLst>
           </p:cNvPr>
@@ -6095,15 +6148,51 @@
         </p:blipFill>
         <p:spPr>
           <a:xfrm>
-            <a:off x="1621718" y="1830125"/>
-            <a:ext cx="9009524" cy="4239370"/>
-          </a:xfrm>
+            <a:off x="1097280" y="1872767"/>
+            <a:ext cx="4859219" cy="3812415"/>
+          </a:xfrm>
+        </p:spPr>
+      </p:pic>
+      <p:pic>
+        <p:nvPicPr>
+          <p:cNvPr id="7" name="Picture 6">
+            <a:extLst>
+              <a:ext uri="{FF2B5EF4-FFF2-40B4-BE49-F238E27FC236}">
+                <a16:creationId xmlns:a16="http://schemas.microsoft.com/office/drawing/2014/main" id="{8C3551D9-B0B5-49E0-9BC8-BDC253743B24}"/>
+              </a:ext>
+            </a:extLst>
+          </p:cNvPr>
+          <p:cNvPicPr>
+            <a:picLocks noChangeAspect="1"/>
+          </p:cNvPicPr>
+          <p:nvPr/>
+        </p:nvPicPr>
+        <p:blipFill>
+          <a:blip r:embed="rId3">
+            <a:extLst>
+              <a:ext uri="{28A0092B-C50C-407E-A947-70E740481C1C}">
+                <a14:useLocalDpi xmlns:a14="http://schemas.microsoft.com/office/drawing/2010/main" val="0"/>
+              </a:ext>
+            </a:extLst>
+          </a:blip>
+          <a:stretch>
+            <a:fillRect/>
+          </a:stretch>
+        </p:blipFill>
+        <p:spPr>
+          <a:xfrm>
+            <a:off x="5579164" y="1872767"/>
+            <a:ext cx="6612835" cy="4294328"/>
+          </a:xfrm>
+          <a:prstGeom prst="rect">
+            <a:avLst/>
+          </a:prstGeom>
         </p:spPr>
       </p:pic>
     </p:spTree>
     <p:extLst>
       <p:ext uri="{BB962C8B-B14F-4D97-AF65-F5344CB8AC3E}">
-        <p14:creationId xmlns:p14="http://schemas.microsoft.com/office/powerpoint/2010/main" val="2633536873"/>
+        <p14:creationId xmlns:p14="http://schemas.microsoft.com/office/powerpoint/2010/main" val="2085122517"/>
       </p:ext>
     </p:extLst>
   </p:cSld>
@@ -6138,7 +6227,7 @@
           <p:cNvPr id="2" name="Title 1">
             <a:extLst>
               <a:ext uri="{FF2B5EF4-FFF2-40B4-BE49-F238E27FC236}">
-                <a16:creationId xmlns:a16="http://schemas.microsoft.com/office/drawing/2014/main" id="{1682E92E-92A8-4A65-BD34-DC3F613EB14C}"/>
+                <a16:creationId xmlns:a16="http://schemas.microsoft.com/office/drawing/2014/main" id="{BD4BA410-5B4B-45AC-9306-A4A730D72534}"/>
               </a:ext>
             </a:extLst>
           </p:cNvPr>
@@ -6156,7 +6245,7 @@
           <a:p>
             <a:r>
               <a:rPr lang="en-US" dirty="0"/>
-              <a:t>In coil room:</a:t>
+              <a:t>In kitchen (average):</a:t>
             </a:r>
           </a:p>
         </p:txBody>
@@ -6166,7 +6255,7 @@
           <p:cNvPr id="5" name="Content Placeholder 4">
             <a:extLst>
               <a:ext uri="{FF2B5EF4-FFF2-40B4-BE49-F238E27FC236}">
-                <a16:creationId xmlns:a16="http://schemas.microsoft.com/office/drawing/2014/main" id="{E93011B5-37D7-492B-9BBD-6831134A687A}"/>
+                <a16:creationId xmlns:a16="http://schemas.microsoft.com/office/drawing/2014/main" id="{D66DAE00-CD2A-49BB-B45D-0E2064101114}"/>
               </a:ext>
             </a:extLst>
           </p:cNvPr>
@@ -6191,51 +6280,15 @@
         </p:blipFill>
         <p:spPr>
           <a:xfrm>
-            <a:off x="993913" y="1846263"/>
-            <a:ext cx="6202017" cy="4022725"/>
-          </a:xfrm>
-        </p:spPr>
-      </p:pic>
-      <p:pic>
-        <p:nvPicPr>
-          <p:cNvPr id="7" name="Picture 6">
-            <a:extLst>
-              <a:ext uri="{FF2B5EF4-FFF2-40B4-BE49-F238E27FC236}">
-                <a16:creationId xmlns:a16="http://schemas.microsoft.com/office/drawing/2014/main" id="{D25E49B6-1588-472A-A3A8-8F9C80E92A18}"/>
-              </a:ext>
-            </a:extLst>
-          </p:cNvPr>
-          <p:cNvPicPr>
-            <a:picLocks noChangeAspect="1"/>
-          </p:cNvPicPr>
-          <p:nvPr/>
-        </p:nvPicPr>
-        <p:blipFill>
-          <a:blip r:embed="rId3">
-            <a:extLst>
-              <a:ext uri="{28A0092B-C50C-407E-A947-70E740481C1C}">
-                <a14:useLocalDpi xmlns:a14="http://schemas.microsoft.com/office/drawing/2010/main" val="0"/>
-              </a:ext>
-            </a:extLst>
-          </a:blip>
-          <a:stretch>
-            <a:fillRect/>
-          </a:stretch>
-        </p:blipFill>
-        <p:spPr>
-          <a:xfrm>
-            <a:off x="6480314" y="1846264"/>
-            <a:ext cx="5327374" cy="4302746"/>
-          </a:xfrm>
-          <a:prstGeom prst="rect">
-            <a:avLst/>
-          </a:prstGeom>
+            <a:off x="1621718" y="1830125"/>
+            <a:ext cx="9009524" cy="4239370"/>
+          </a:xfrm>
         </p:spPr>
       </p:pic>
     </p:spTree>
     <p:extLst>
       <p:ext uri="{BB962C8B-B14F-4D97-AF65-F5344CB8AC3E}">
-        <p14:creationId xmlns:p14="http://schemas.microsoft.com/office/powerpoint/2010/main" val="498486060"/>
+        <p14:creationId xmlns:p14="http://schemas.microsoft.com/office/powerpoint/2010/main" val="2633536873"/>
       </p:ext>
     </p:extLst>
   </p:cSld>
@@ -6270,7 +6323,7 @@
           <p:cNvPr id="2" name="Title 1">
             <a:extLst>
               <a:ext uri="{FF2B5EF4-FFF2-40B4-BE49-F238E27FC236}">
-                <a16:creationId xmlns:a16="http://schemas.microsoft.com/office/drawing/2014/main" id="{80C66CA6-F9B6-4217-A26D-CAB1D50322D8}"/>
+                <a16:creationId xmlns:a16="http://schemas.microsoft.com/office/drawing/2014/main" id="{1682E92E-92A8-4A65-BD34-DC3F613EB14C}"/>
               </a:ext>
             </a:extLst>
           </p:cNvPr>
@@ -6288,7 +6341,7 @@
           <a:p>
             <a:r>
               <a:rPr lang="en-US" dirty="0"/>
-              <a:t>In coil room(average):</a:t>
+              <a:t>In coil room:</a:t>
             </a:r>
           </a:p>
         </p:txBody>
@@ -6298,7 +6351,7 @@
           <p:cNvPr id="5" name="Content Placeholder 4">
             <a:extLst>
               <a:ext uri="{FF2B5EF4-FFF2-40B4-BE49-F238E27FC236}">
-                <a16:creationId xmlns:a16="http://schemas.microsoft.com/office/drawing/2014/main" id="{6B92D316-A04A-4FA8-8B07-3C475A5F5678}"/>
+                <a16:creationId xmlns:a16="http://schemas.microsoft.com/office/drawing/2014/main" id="{E93011B5-37D7-492B-9BBD-6831134A687A}"/>
               </a:ext>
             </a:extLst>
           </p:cNvPr>
@@ -6323,33 +6376,60 @@
         </p:blipFill>
         <p:spPr>
           <a:xfrm>
-            <a:off x="1588068" y="2095721"/>
-            <a:ext cx="9076190" cy="3907514"/>
-          </a:xfrm>
+            <a:off x="993913" y="1846263"/>
+            <a:ext cx="6202017" cy="4022725"/>
+          </a:xfrm>
+        </p:spPr>
+      </p:pic>
+      <p:pic>
+        <p:nvPicPr>
+          <p:cNvPr id="7" name="Picture 6">
+            <a:extLst>
+              <a:ext uri="{FF2B5EF4-FFF2-40B4-BE49-F238E27FC236}">
+                <a16:creationId xmlns:a16="http://schemas.microsoft.com/office/drawing/2014/main" id="{D25E49B6-1588-472A-A3A8-8F9C80E92A18}"/>
+              </a:ext>
+            </a:extLst>
+          </p:cNvPr>
+          <p:cNvPicPr>
+            <a:picLocks noChangeAspect="1"/>
+          </p:cNvPicPr>
+          <p:nvPr/>
+        </p:nvPicPr>
+        <p:blipFill>
+          <a:blip r:embed="rId3">
+            <a:extLst>
+              <a:ext uri="{28A0092B-C50C-407E-A947-70E740481C1C}">
+                <a14:useLocalDpi xmlns:a14="http://schemas.microsoft.com/office/drawing/2010/main" val="0"/>
+              </a:ext>
+            </a:extLst>
+          </a:blip>
+          <a:stretch>
+            <a:fillRect/>
+          </a:stretch>
+        </p:blipFill>
+        <p:spPr>
+          <a:xfrm>
+            <a:off x="6480314" y="1846264"/>
+            <a:ext cx="5327374" cy="4302746"/>
+          </a:xfrm>
+          <a:prstGeom prst="rect">
+            <a:avLst/>
+          </a:prstGeom>
         </p:spPr>
       </p:pic>
     </p:spTree>
     <p:extLst>
       <p:ext uri="{BB962C8B-B14F-4D97-AF65-F5344CB8AC3E}">
-        <p14:creationId xmlns:p14="http://schemas.microsoft.com/office/powerpoint/2010/main" val="3127610110"/>
+        <p14:creationId xmlns:p14="http://schemas.microsoft.com/office/powerpoint/2010/main" val="498486060"/>
       </p:ext>
     </p:extLst>
   </p:cSld>
   <p:clrMapOvr>
     <a:masterClrMapping/>
   </p:clrMapOvr>
-  <mc:AlternateContent xmlns:mc="http://schemas.openxmlformats.org/markup-compatibility/2006" xmlns:p14="http://schemas.microsoft.com/office/powerpoint/2010/main">
-    <mc:Choice Requires="p14">
-      <p:transition spd="slow" p14:dur="1500">
-        <p:split orient="vert"/>
-      </p:transition>
-    </mc:Choice>
-    <mc:Fallback xmlns="">
-      <p:transition spd="slow">
-        <p:split orient="vert"/>
-      </p:transition>
-    </mc:Fallback>
-  </mc:AlternateContent>
+  <p:transition spd="slow">
+    <p:push dir="u"/>
+  </p:transition>
 </p:sld>
 </file>
 
@@ -6375,7 +6455,7 @@
           <p:cNvPr id="2" name="Title 1">
             <a:extLst>
               <a:ext uri="{FF2B5EF4-FFF2-40B4-BE49-F238E27FC236}">
-                <a16:creationId xmlns:a16="http://schemas.microsoft.com/office/drawing/2014/main" id="{E48CEE27-6DD1-4D8E-ADC2-E3FE90EB2A3E}"/>
+                <a16:creationId xmlns:a16="http://schemas.microsoft.com/office/drawing/2014/main" id="{80C66CA6-F9B6-4217-A26D-CAB1D50322D8}"/>
               </a:ext>
             </a:extLst>
           </p:cNvPr>
@@ -6393,7 +6473,7 @@
           <a:p>
             <a:r>
               <a:rPr lang="en-US" dirty="0"/>
-              <a:t>Air quality (in different cases):</a:t>
+              <a:t>In coil room(average):</a:t>
             </a:r>
           </a:p>
         </p:txBody>
@@ -6403,7 +6483,7 @@
           <p:cNvPr id="5" name="Content Placeholder 4">
             <a:extLst>
               <a:ext uri="{FF2B5EF4-FFF2-40B4-BE49-F238E27FC236}">
-                <a16:creationId xmlns:a16="http://schemas.microsoft.com/office/drawing/2014/main" id="{3E0E41A8-7CD2-460F-8F79-4D0DE2FA43C3}"/>
+                <a16:creationId xmlns:a16="http://schemas.microsoft.com/office/drawing/2014/main" id="{6B92D316-A04A-4FA8-8B07-3C475A5F5678}"/>
               </a:ext>
             </a:extLst>
           </p:cNvPr>
@@ -6428,15 +6508,15 @@
         </p:blipFill>
         <p:spPr>
           <a:xfrm>
-            <a:off x="1404730" y="1846263"/>
-            <a:ext cx="9621079" cy="4262989"/>
+            <a:off x="1588068" y="2095721"/>
+            <a:ext cx="9076190" cy="3907514"/>
           </a:xfrm>
         </p:spPr>
       </p:pic>
     </p:spTree>
     <p:extLst>
       <p:ext uri="{BB962C8B-B14F-4D97-AF65-F5344CB8AC3E}">
-        <p14:creationId xmlns:p14="http://schemas.microsoft.com/office/powerpoint/2010/main" val="2396428995"/>
+        <p14:creationId xmlns:p14="http://schemas.microsoft.com/office/powerpoint/2010/main" val="3127610110"/>
       </p:ext>
     </p:extLst>
   </p:cSld>
@@ -6480,6 +6560,111 @@
           <p:cNvPr id="2" name="Title 1">
             <a:extLst>
               <a:ext uri="{FF2B5EF4-FFF2-40B4-BE49-F238E27FC236}">
+                <a16:creationId xmlns:a16="http://schemas.microsoft.com/office/drawing/2014/main" id="{E48CEE27-6DD1-4D8E-ADC2-E3FE90EB2A3E}"/>
+              </a:ext>
+            </a:extLst>
+          </p:cNvPr>
+          <p:cNvSpPr>
+            <a:spLocks noGrp="1"/>
+          </p:cNvSpPr>
+          <p:nvPr>
+            <p:ph type="title"/>
+          </p:nvPr>
+        </p:nvSpPr>
+        <p:spPr/>
+        <p:txBody>
+          <a:bodyPr/>
+          <a:lstStyle/>
+          <a:p>
+            <a:r>
+              <a:rPr lang="en-US" dirty="0"/>
+              <a:t>Air quality (in different cases):</a:t>
+            </a:r>
+          </a:p>
+        </p:txBody>
+      </p:sp>
+      <p:pic>
+        <p:nvPicPr>
+          <p:cNvPr id="5" name="Content Placeholder 4">
+            <a:extLst>
+              <a:ext uri="{FF2B5EF4-FFF2-40B4-BE49-F238E27FC236}">
+                <a16:creationId xmlns:a16="http://schemas.microsoft.com/office/drawing/2014/main" id="{3E0E41A8-7CD2-460F-8F79-4D0DE2FA43C3}"/>
+              </a:ext>
+            </a:extLst>
+          </p:cNvPr>
+          <p:cNvPicPr>
+            <a:picLocks noGrp="1" noChangeAspect="1"/>
+          </p:cNvPicPr>
+          <p:nvPr>
+            <p:ph idx="1"/>
+          </p:nvPr>
+        </p:nvPicPr>
+        <p:blipFill>
+          <a:blip r:embed="rId2">
+            <a:extLst>
+              <a:ext uri="{28A0092B-C50C-407E-A947-70E740481C1C}">
+                <a14:useLocalDpi xmlns:a14="http://schemas.microsoft.com/office/drawing/2010/main" val="0"/>
+              </a:ext>
+            </a:extLst>
+          </a:blip>
+          <a:stretch>
+            <a:fillRect/>
+          </a:stretch>
+        </p:blipFill>
+        <p:spPr>
+          <a:xfrm>
+            <a:off x="1404730" y="1846263"/>
+            <a:ext cx="9621079" cy="4262989"/>
+          </a:xfrm>
+        </p:spPr>
+      </p:pic>
+    </p:spTree>
+    <p:extLst>
+      <p:ext uri="{BB962C8B-B14F-4D97-AF65-F5344CB8AC3E}">
+        <p14:creationId xmlns:p14="http://schemas.microsoft.com/office/powerpoint/2010/main" val="2396428995"/>
+      </p:ext>
+    </p:extLst>
+  </p:cSld>
+  <p:clrMapOvr>
+    <a:masterClrMapping/>
+  </p:clrMapOvr>
+  <mc:AlternateContent xmlns:mc="http://schemas.openxmlformats.org/markup-compatibility/2006" xmlns:p14="http://schemas.microsoft.com/office/powerpoint/2010/main">
+    <mc:Choice Requires="p14">
+      <p:transition spd="slow" p14:dur="1500">
+        <p:split orient="vert"/>
+      </p:transition>
+    </mc:Choice>
+    <mc:Fallback xmlns="">
+      <p:transition spd="slow">
+        <p:split orient="vert"/>
+      </p:transition>
+    </mc:Fallback>
+  </mc:AlternateContent>
+</p:sld>
+</file>
+
+<file path=ppt/slides/slide28.xml><?xml version="1.0" encoding="utf-8"?>
+<p:sld xmlns:a="http://schemas.openxmlformats.org/drawingml/2006/main" xmlns:r="http://schemas.openxmlformats.org/officeDocument/2006/relationships" xmlns:p="http://schemas.openxmlformats.org/presentationml/2006/main">
+  <p:cSld>
+    <p:spTree>
+      <p:nvGrpSpPr>
+        <p:cNvPr id="1" name=""/>
+        <p:cNvGrpSpPr/>
+        <p:nvPr/>
+      </p:nvGrpSpPr>
+      <p:grpSpPr>
+        <a:xfrm>
+          <a:off x="0" y="0"/>
+          <a:ext cx="0" cy="0"/>
+          <a:chOff x="0" y="0"/>
+          <a:chExt cx="0" cy="0"/>
+        </a:xfrm>
+      </p:grpSpPr>
+      <p:sp>
+        <p:nvSpPr>
+          <p:cNvPr id="2" name="Title 1">
+            <a:extLst>
+              <a:ext uri="{FF2B5EF4-FFF2-40B4-BE49-F238E27FC236}">
                 <a16:creationId xmlns:a16="http://schemas.microsoft.com/office/drawing/2014/main" id="{791AEC1A-BAAA-410A-8427-124B36E5AB50}"/>
               </a:ext>
             </a:extLst>
@@ -6563,7 +6748,7 @@
 </p:sld>
 </file>
 
-<file path=ppt/slides/slide28.xml><?xml version="1.0" encoding="utf-8"?>
+<file path=ppt/slides/slide29.xml><?xml version="1.0" encoding="utf-8"?>
 <p:sld xmlns:a="http://schemas.openxmlformats.org/drawingml/2006/main" xmlns:r="http://schemas.openxmlformats.org/officeDocument/2006/relationships" xmlns:p="http://schemas.openxmlformats.org/presentationml/2006/main">
   <p:cSld>
     <p:spTree>
@@ -7447,7 +7632,7 @@
           <p:cNvPr id="2" name="Title 1">
             <a:extLst>
               <a:ext uri="{FF2B5EF4-FFF2-40B4-BE49-F238E27FC236}">
-                <a16:creationId xmlns:a16="http://schemas.microsoft.com/office/drawing/2014/main" id="{9E7C817A-10C3-4A0E-989F-2F9FF51295CB}"/>
+                <a16:creationId xmlns:a16="http://schemas.microsoft.com/office/drawing/2014/main" id="{8C0A0031-7D5A-433B-B90B-93D039163591}"/>
               </a:ext>
             </a:extLst>
           </p:cNvPr>
@@ -7465,17 +7650,17 @@
           <a:p>
             <a:r>
               <a:rPr lang="en-US" dirty="0"/>
-              <a:t>Coin vibration motor</a:t>
-            </a:r>
-          </a:p>
-        </p:txBody>
-      </p:sp>
-      <p:sp>
-        <p:nvSpPr>
-          <p:cNvPr id="3" name="Content Placeholder 2">
+              <a:t>Water sensor:</a:t>
+            </a:r>
+          </a:p>
+        </p:txBody>
+      </p:sp>
+      <p:sp>
+        <p:nvSpPr>
+          <p:cNvPr id="6" name="Content Placeholder 5">
             <a:extLst>
               <a:ext uri="{FF2B5EF4-FFF2-40B4-BE49-F238E27FC236}">
-                <a16:creationId xmlns:a16="http://schemas.microsoft.com/office/drawing/2014/main" id="{316FBCA1-EE6A-4590-9E6B-62E8C2052CA7}"/>
+                <a16:creationId xmlns:a16="http://schemas.microsoft.com/office/drawing/2014/main" id="{CAD5AA32-EA3B-4876-953C-7D142EEAAEE4}"/>
               </a:ext>
             </a:extLst>
           </p:cNvPr>
@@ -7489,52 +7674,36 @@
         <p:spPr>
           <a:xfrm>
             <a:off x="1097280" y="1845734"/>
-            <a:ext cx="7251590" cy="3945466"/>
+            <a:ext cx="5767346" cy="4023360"/>
           </a:xfrm>
         </p:spPr>
         <p:txBody>
           <a:bodyPr>
-            <a:normAutofit lnSpcReduction="10000"/>
+            <a:normAutofit/>
           </a:bodyPr>
           <a:lstStyle/>
           <a:p>
             <a:r>
               <a:rPr lang="en-US" sz="2800" dirty="0"/>
-              <a:t>At only 7 mm in diameter and 2.1 mm thick, </a:t>
-            </a:r>
-            <a:r>
-              <a:rPr lang="en-US" sz="2800" dirty="0" err="1">
-                <a:hlinkClick r:id="rId2"/>
-              </a:rPr>
-              <a:t>Jinlong</a:t>
-            </a:r>
-            <a:r>
-              <a:rPr lang="en-US" sz="2800" dirty="0">
-                <a:hlinkClick r:id="rId2"/>
-              </a:rPr>
-              <a:t> Machinery’s</a:t>
+              <a:t>Water sensor has 3 pins one is ground one is </a:t>
+            </a:r>
+            <a:r>
+              <a:rPr lang="en-US" sz="2800" dirty="0" err="1"/>
+              <a:t>vcc</a:t>
             </a:r>
             <a:r>
               <a:rPr lang="en-US" sz="2800" dirty="0"/>
-              <a:t> C0720B series is currently the smallest coin vibration motor on the market . Versions with foam pads and without adhesive are also available. It was designed for devices requiring vibration alerts or haptic feedback. Because it produces a relatively low vibrational force of 0.4 G, this motor is best suited for use in light weight devices placed directly against the user’s skin. The motor has an operating voltage range of 2.7 to 3.3 V</a:t>
-            </a:r>
-            <a:r>
-              <a:rPr lang="en-US" sz="2800" baseline="-25000" dirty="0"/>
-              <a:t>DC</a:t>
-            </a:r>
-            <a:r>
-              <a:rPr lang="en-US" sz="2800" dirty="0"/>
-              <a:t>.</a:t>
+              <a:t> and the other is analog data pin. It’s analog range is 480 to 705. we converted this raw number 00 to 40mm in order to calculate.</a:t>
             </a:r>
           </a:p>
         </p:txBody>
       </p:sp>
       <p:pic>
         <p:nvPicPr>
-          <p:cNvPr id="5" name="Picture 4">
+          <p:cNvPr id="8" name="Picture 7">
             <a:extLst>
               <a:ext uri="{FF2B5EF4-FFF2-40B4-BE49-F238E27FC236}">
-                <a16:creationId xmlns:a16="http://schemas.microsoft.com/office/drawing/2014/main" id="{487C24B9-6812-4310-A19E-3891038B7F8A}"/>
+                <a16:creationId xmlns:a16="http://schemas.microsoft.com/office/drawing/2014/main" id="{9FADD595-BBAE-4BBA-AFC3-EB336BF4E439}"/>
               </a:ext>
             </a:extLst>
           </p:cNvPr>
@@ -7544,7 +7713,7 @@
           <p:nvPr/>
         </p:nvPicPr>
         <p:blipFill>
-          <a:blip r:embed="rId3">
+          <a:blip r:embed="rId2">
             <a:extLst>
               <a:ext uri="{28A0092B-C50C-407E-A947-70E740481C1C}">
                 <a14:useLocalDpi xmlns:a14="http://schemas.microsoft.com/office/drawing/2010/main" val="0"/>
@@ -7557,8 +7726,8 @@
         </p:blipFill>
         <p:spPr>
           <a:xfrm>
-            <a:off x="8229600" y="2058702"/>
-            <a:ext cx="3837994" cy="4227797"/>
+            <a:off x="7566990" y="1737360"/>
+            <a:ext cx="4091609" cy="4504414"/>
           </a:xfrm>
           <a:prstGeom prst="rect">
             <a:avLst/>
@@ -7568,13 +7737,16 @@
     </p:spTree>
     <p:extLst>
       <p:ext uri="{BB962C8B-B14F-4D97-AF65-F5344CB8AC3E}">
-        <p14:creationId xmlns:p14="http://schemas.microsoft.com/office/powerpoint/2010/main" val="1046113323"/>
+        <p14:creationId xmlns:p14="http://schemas.microsoft.com/office/powerpoint/2010/main" val="3521969094"/>
       </p:ext>
     </p:extLst>
   </p:cSld>
   <p:clrMapOvr>
     <a:masterClrMapping/>
   </p:clrMapOvr>
+  <p:transition spd="slow">
+    <p:push dir="u"/>
+  </p:transition>
 </p:sld>
 </file>
 
@@ -7600,7 +7772,7 @@
           <p:cNvPr id="2" name="Title 1">
             <a:extLst>
               <a:ext uri="{FF2B5EF4-FFF2-40B4-BE49-F238E27FC236}">
-                <a16:creationId xmlns:a16="http://schemas.microsoft.com/office/drawing/2014/main" id="{77022CDD-5C30-4DD9-978D-449A42B3BD97}"/>
+                <a16:creationId xmlns:a16="http://schemas.microsoft.com/office/drawing/2014/main" id="{9E7C817A-10C3-4A0E-989F-2F9FF51295CB}"/>
               </a:ext>
             </a:extLst>
           </p:cNvPr>
@@ -7618,29 +7790,86 @@
           <a:p>
             <a:r>
               <a:rPr lang="en-US" dirty="0"/>
-              <a:t>Pressure sensor (bmp 180)</a:t>
+              <a:t>Coin vibration motor</a:t>
+            </a:r>
+          </a:p>
+        </p:txBody>
+      </p:sp>
+      <p:sp>
+        <p:nvSpPr>
+          <p:cNvPr id="3" name="Content Placeholder 2">
+            <a:extLst>
+              <a:ext uri="{FF2B5EF4-FFF2-40B4-BE49-F238E27FC236}">
+                <a16:creationId xmlns:a16="http://schemas.microsoft.com/office/drawing/2014/main" id="{316FBCA1-EE6A-4590-9E6B-62E8C2052CA7}"/>
+              </a:ext>
+            </a:extLst>
+          </p:cNvPr>
+          <p:cNvSpPr>
+            <a:spLocks noGrp="1"/>
+          </p:cNvSpPr>
+          <p:nvPr>
+            <p:ph idx="1"/>
+          </p:nvPr>
+        </p:nvSpPr>
+        <p:spPr>
+          <a:xfrm>
+            <a:off x="1097280" y="1845734"/>
+            <a:ext cx="7251590" cy="3945466"/>
+          </a:xfrm>
+        </p:spPr>
+        <p:txBody>
+          <a:bodyPr>
+            <a:normAutofit lnSpcReduction="10000"/>
+          </a:bodyPr>
+          <a:lstStyle/>
+          <a:p>
+            <a:r>
+              <a:rPr lang="en-US" sz="2800" dirty="0"/>
+              <a:t>At only 7 mm in diameter and 2.1 mm thick, </a:t>
+            </a:r>
+            <a:r>
+              <a:rPr lang="en-US" sz="2800" dirty="0" err="1">
+                <a:hlinkClick r:id="rId2"/>
+              </a:rPr>
+              <a:t>Jinlong</a:t>
+            </a:r>
+            <a:r>
+              <a:rPr lang="en-US" sz="2800" dirty="0">
+                <a:hlinkClick r:id="rId2"/>
+              </a:rPr>
+              <a:t> Machinery’s</a:t>
+            </a:r>
+            <a:r>
+              <a:rPr lang="en-US" sz="2800" dirty="0"/>
+              <a:t> C0720B series is currently the smallest coin vibration motor on the market . Versions with foam pads and without adhesive are also available. It was designed for devices requiring vibration alerts or haptic feedback. Because it produces a relatively low vibrational force of 0.4 G, this motor is best suited for use in light weight devices placed directly against the user’s skin. The motor has an operating voltage range of 2.7 to 3.3 V</a:t>
+            </a:r>
+            <a:r>
+              <a:rPr lang="en-US" sz="2800" baseline="-25000" dirty="0"/>
+              <a:t>DC</a:t>
+            </a:r>
+            <a:r>
+              <a:rPr lang="en-US" sz="2800" dirty="0"/>
+              <a:t>.</a:t>
             </a:r>
           </a:p>
         </p:txBody>
       </p:sp>
       <p:pic>
         <p:nvPicPr>
-          <p:cNvPr id="6" name="Content Placeholder 5">
+          <p:cNvPr id="5" name="Picture 4">
             <a:extLst>
               <a:ext uri="{FF2B5EF4-FFF2-40B4-BE49-F238E27FC236}">
-                <a16:creationId xmlns:a16="http://schemas.microsoft.com/office/drawing/2014/main" id="{E46EB732-01F7-41ED-AA3F-BEBB6B1E9AED}"/>
+                <a16:creationId xmlns:a16="http://schemas.microsoft.com/office/drawing/2014/main" id="{487C24B9-6812-4310-A19E-3891038B7F8A}"/>
               </a:ext>
             </a:extLst>
           </p:cNvPr>
           <p:cNvPicPr>
-            <a:picLocks noGrp="1" noChangeAspect="1"/>
+            <a:picLocks noChangeAspect="1"/>
           </p:cNvPicPr>
-          <p:nvPr>
-            <p:ph idx="1"/>
-          </p:nvPr>
+          <p:nvPr/>
         </p:nvPicPr>
         <p:blipFill>
-          <a:blip r:embed="rId2">
+          <a:blip r:embed="rId3">
             <a:extLst>
               <a:ext uri="{28A0092B-C50C-407E-A947-70E740481C1C}">
                 <a14:useLocalDpi xmlns:a14="http://schemas.microsoft.com/office/drawing/2010/main" val="0"/>
@@ -7653,111 +7882,24 @@
         </p:blipFill>
         <p:spPr>
           <a:xfrm>
-            <a:off x="8143092" y="1987826"/>
-            <a:ext cx="3811059" cy="3811059"/>
-          </a:xfrm>
-        </p:spPr>
-      </p:pic>
-      <p:sp>
-        <p:nvSpPr>
-          <p:cNvPr id="4" name="Rectangle 3">
-            <a:extLst>
-              <a:ext uri="{FF2B5EF4-FFF2-40B4-BE49-F238E27FC236}">
-                <a16:creationId xmlns:a16="http://schemas.microsoft.com/office/drawing/2014/main" id="{B314C108-267D-448E-9E9A-C8DA7596824E}"/>
-              </a:ext>
-            </a:extLst>
-          </p:cNvPr>
-          <p:cNvSpPr/>
-          <p:nvPr/>
-        </p:nvSpPr>
-        <p:spPr>
-          <a:xfrm>
-            <a:off x="1097280" y="1845734"/>
-            <a:ext cx="6588981" cy="3108543"/>
+            <a:off x="8229600" y="2058702"/>
+            <a:ext cx="3837994" cy="4227797"/>
           </a:xfrm>
           <a:prstGeom prst="rect">
             <a:avLst/>
           </a:prstGeom>
         </p:spPr>
-        <p:txBody>
-          <a:bodyPr wrap="square">
-            <a:spAutoFit/>
-          </a:bodyPr>
-          <a:lstStyle/>
-          <a:p>
-            <a:r>
-              <a:rPr lang="en-US" sz="2800" dirty="0">
-                <a:solidFill>
-                  <a:srgbClr val="333333"/>
-                </a:solidFill>
-                <a:latin typeface="Helvetica Neue"/>
-              </a:rPr>
-              <a:t>The definition of pressure is a force "pressing" on an area. A common unit of pressure is pounds per square inch (psi). One pound, pressing on one square inch, equals one psi. The </a:t>
-            </a:r>
-            <a:r>
-              <a:rPr lang="en-US" sz="2800" dirty="0">
-                <a:solidFill>
-                  <a:srgbClr val="E0311D"/>
-                </a:solidFill>
-                <a:latin typeface="Helvetica Neue"/>
-                <a:hlinkClick r:id="rId3"/>
-              </a:rPr>
-              <a:t>SI unit</a:t>
-            </a:r>
-            <a:r>
-              <a:rPr lang="en-US" sz="2800" dirty="0">
-                <a:solidFill>
-                  <a:srgbClr val="333333"/>
-                </a:solidFill>
-                <a:latin typeface="Helvetica Neue"/>
-              </a:rPr>
-              <a:t> is newtons per square meter, which are called </a:t>
-            </a:r>
-            <a:r>
-              <a:rPr lang="en-US" sz="2800" dirty="0">
-                <a:solidFill>
-                  <a:srgbClr val="E0311D"/>
-                </a:solidFill>
-                <a:latin typeface="Helvetica Neue"/>
-                <a:hlinkClick r:id="rId4"/>
-              </a:rPr>
-              <a:t>pascals (Pa)</a:t>
-            </a:r>
-            <a:r>
-              <a:rPr lang="en-US" sz="2800" dirty="0">
-                <a:solidFill>
-                  <a:srgbClr val="333333"/>
-                </a:solidFill>
-                <a:latin typeface="Helvetica Neue"/>
-              </a:rPr>
-              <a:t>.</a:t>
-            </a:r>
-            <a:endParaRPr lang="en-US" sz="2800" dirty="0"/>
-          </a:p>
-        </p:txBody>
-      </p:sp>
+      </p:pic>
     </p:spTree>
     <p:extLst>
       <p:ext uri="{BB962C8B-B14F-4D97-AF65-F5344CB8AC3E}">
-        <p14:creationId xmlns:p14="http://schemas.microsoft.com/office/powerpoint/2010/main" val="992587649"/>
+        <p14:creationId xmlns:p14="http://schemas.microsoft.com/office/powerpoint/2010/main" val="1046113323"/>
       </p:ext>
     </p:extLst>
   </p:cSld>
   <p:clrMapOvr>
     <a:masterClrMapping/>
   </p:clrMapOvr>
-  <mc:AlternateContent xmlns:mc="http://schemas.openxmlformats.org/markup-compatibility/2006" xmlns:p14="http://schemas.microsoft.com/office/powerpoint/2010/main">
-    <mc:Choice Requires="p14">
-      <p:transition spd="slow" p14:dur="1250">
-        <p14:switch dir="r"/>
-      </p:transition>
-    </mc:Choice>
-    <mc:Fallback xmlns="">
-      <p:transition spd="slow">
-        <p:fade/>
-      </p:transition>
-    </mc:Fallback>
-  </mc:AlternateContent>
 </p:sld>
 </file>
 

</xml_diff>